<commit_message>
updated methodology both in read me and ppt
</commit_message>
<xml_diff>
--- a/Imposter.pptx
+++ b/Imposter.pptx
@@ -109,6 +109,11 @@
       </a:defRPr>
     </a:lvl9pPr>
   </p:defaultTextStyle>
+  <p:extLst>
+    <p:ext uri="{EFAFB233-063F-42B5-8137-9DF3F51BA10A}">
+      <p15:sldGuideLst xmlns:p15="http://schemas.microsoft.com/office/powerpoint/2012/main"/>
+    </p:ext>
+  </p:extLst>
 </p:presentation>
 </file>
 
@@ -858,7 +863,7 @@
             <a:fld id="{B61BEF0D-F0BB-DE4B-95CE-6DB70DBA9567}" type="datetimeFigureOut">
               <a:rPr lang="en-US" dirty="0"/>
               <a:pPr/>
-              <a:t>10/6/2025</a:t>
+              <a:t>10/7/2025</a:t>
             </a:fld>
             <a:endParaRPr lang="en-US" dirty="0"/>
           </a:p>
@@ -1106,7 +1111,7 @@
             <a:fld id="{B61BEF0D-F0BB-DE4B-95CE-6DB70DBA9567}" type="datetimeFigureOut">
               <a:rPr lang="en-US" dirty="0"/>
               <a:pPr/>
-              <a:t>10/6/2025</a:t>
+              <a:t>10/7/2025</a:t>
             </a:fld>
             <a:endParaRPr lang="en-US" dirty="0"/>
           </a:p>
@@ -1417,7 +1422,7 @@
             <a:fld id="{B61BEF0D-F0BB-DE4B-95CE-6DB70DBA9567}" type="datetimeFigureOut">
               <a:rPr lang="en-US" dirty="0"/>
               <a:pPr/>
-              <a:t>10/6/2025</a:t>
+              <a:t>10/7/2025</a:t>
             </a:fld>
             <a:endParaRPr lang="en-US" dirty="0"/>
           </a:p>
@@ -1747,7 +1752,7 @@
             <a:fld id="{B61BEF0D-F0BB-DE4B-95CE-6DB70DBA9567}" type="datetimeFigureOut">
               <a:rPr lang="en-US" dirty="0"/>
               <a:pPr/>
-              <a:t>10/6/2025</a:t>
+              <a:t>10/7/2025</a:t>
             </a:fld>
             <a:endParaRPr lang="en-US" dirty="0"/>
           </a:p>
@@ -2058,7 +2063,7 @@
             <a:fld id="{B61BEF0D-F0BB-DE4B-95CE-6DB70DBA9567}" type="datetimeFigureOut">
               <a:rPr lang="en-US" dirty="0"/>
               <a:pPr/>
-              <a:t>10/6/2025</a:t>
+              <a:t>10/7/2025</a:t>
             </a:fld>
             <a:endParaRPr lang="en-US" dirty="0"/>
           </a:p>
@@ -2448,7 +2453,7 @@
             <a:fld id="{B61BEF0D-F0BB-DE4B-95CE-6DB70DBA9567}" type="datetimeFigureOut">
               <a:rPr lang="en-US" dirty="0"/>
               <a:pPr/>
-              <a:t>10/6/2025</a:t>
+              <a:t>10/7/2025</a:t>
             </a:fld>
             <a:endParaRPr lang="en-US" dirty="0"/>
           </a:p>
@@ -2614,7 +2619,7 @@
           <a:p>
             <a:fld id="{55C6B4A9-1611-4792-9094-5F34BCA07E0B}" type="datetimeFigureOut">
               <a:rPr lang="en-US" dirty="0"/>
-              <a:t>10/6/2025</a:t>
+              <a:t>10/7/2025</a:t>
             </a:fld>
             <a:endParaRPr lang="en-US" dirty="0"/>
           </a:p>
@@ -2790,7 +2795,7 @@
             <a:fld id="{B61BEF0D-F0BB-DE4B-95CE-6DB70DBA9567}" type="datetimeFigureOut">
               <a:rPr lang="en-US" dirty="0"/>
               <a:pPr/>
-              <a:t>10/6/2025</a:t>
+              <a:t>10/7/2025</a:t>
             </a:fld>
             <a:endParaRPr lang="en-US" dirty="0"/>
           </a:p>
@@ -2956,7 +2961,7 @@
           <a:p>
             <a:fld id="{42A54C80-263E-416B-A8E0-580EDEADCBDC}" type="datetimeFigureOut">
               <a:rPr lang="en-US" dirty="0"/>
-              <a:t>10/6/2025</a:t>
+              <a:t>10/7/2025</a:t>
             </a:fld>
             <a:endParaRPr lang="en-US" dirty="0"/>
           </a:p>
@@ -3199,7 +3204,7 @@
             <a:fld id="{B61BEF0D-F0BB-DE4B-95CE-6DB70DBA9567}" type="datetimeFigureOut">
               <a:rPr lang="en-US" dirty="0"/>
               <a:pPr/>
-              <a:t>10/6/2025</a:t>
+              <a:t>10/7/2025</a:t>
             </a:fld>
             <a:endParaRPr lang="en-US" dirty="0"/>
           </a:p>
@@ -3427,7 +3432,7 @@
           <a:p>
             <a:fld id="{42A54C80-263E-416B-A8E0-580EDEADCBDC}" type="datetimeFigureOut">
               <a:rPr lang="en-US" dirty="0"/>
-              <a:t>10/6/2025</a:t>
+              <a:t>10/7/2025</a:t>
             </a:fld>
             <a:endParaRPr lang="en-US" dirty="0"/>
           </a:p>
@@ -3797,7 +3802,7 @@
             <a:fld id="{B61BEF0D-F0BB-DE4B-95CE-6DB70DBA9567}" type="datetimeFigureOut">
               <a:rPr lang="en-US" dirty="0"/>
               <a:pPr/>
-              <a:t>10/6/2025</a:t>
+              <a:t>10/7/2025</a:t>
             </a:fld>
             <a:endParaRPr lang="en-US" dirty="0"/>
           </a:p>
@@ -3917,7 +3922,7 @@
             <a:fld id="{B61BEF0D-F0BB-DE4B-95CE-6DB70DBA9567}" type="datetimeFigureOut">
               <a:rPr lang="en-US" dirty="0"/>
               <a:pPr/>
-              <a:t>10/6/2025</a:t>
+              <a:t>10/7/2025</a:t>
             </a:fld>
             <a:endParaRPr lang="en-US" dirty="0"/>
           </a:p>
@@ -4009,7 +4014,7 @@
             <a:fld id="{B61BEF0D-F0BB-DE4B-95CE-6DB70DBA9567}" type="datetimeFigureOut">
               <a:rPr lang="en-US" dirty="0"/>
               <a:pPr/>
-              <a:t>10/6/2025</a:t>
+              <a:t>10/7/2025</a:t>
             </a:fld>
             <a:endParaRPr lang="en-US" dirty="0"/>
           </a:p>
@@ -4260,7 +4265,7 @@
           <a:p>
             <a:fld id="{42A54C80-263E-416B-A8E0-580EDEADCBDC}" type="datetimeFigureOut">
               <a:rPr lang="en-US" dirty="0"/>
-              <a:t>10/6/2025</a:t>
+              <a:t>10/7/2025</a:t>
             </a:fld>
             <a:endParaRPr lang="en-US" dirty="0"/>
           </a:p>
@@ -4562,7 +4567,7 @@
             <a:fld id="{B61BEF0D-F0BB-DE4B-95CE-6DB70DBA9567}" type="datetimeFigureOut">
               <a:rPr lang="en-US" dirty="0"/>
               <a:pPr/>
-              <a:t>10/6/2025</a:t>
+              <a:t>10/7/2025</a:t>
             </a:fld>
             <a:endParaRPr lang="en-US" dirty="0"/>
           </a:p>
@@ -5260,7 +5265,7 @@
             <a:fld id="{B61BEF0D-F0BB-DE4B-95CE-6DB70DBA9567}" type="datetimeFigureOut">
               <a:rPr lang="en-US" dirty="0"/>
               <a:pPr/>
-              <a:t>10/6/2025</a:t>
+              <a:t>10/7/2025</a:t>
             </a:fld>
             <a:endParaRPr lang="en-US" dirty="0"/>
           </a:p>
@@ -6133,38 +6138,65 @@
             <p:ph idx="1"/>
           </p:nvPr>
         </p:nvSpPr>
-        <p:spPr/>
-        <p:txBody>
-          <a:bodyPr/>
+        <p:spPr>
+          <a:xfrm>
+            <a:off x="677333" y="1602557"/>
+            <a:ext cx="9626163" cy="4438805"/>
+          </a:xfrm>
+        </p:spPr>
+        <p:txBody>
+          <a:bodyPr>
+            <a:normAutofit lnSpcReduction="10000"/>
+          </a:bodyPr>
           <a:lstStyle/>
           <a:p>
             <a:r>
               <a:rPr lang="en-US" dirty="0"/>
-              <a:t>The project follows a structured approach beginning with </a:t>
+              <a:t>This multi-class classification project, aimed at </a:t>
             </a:r>
             <a:r>
               <a:rPr lang="en-US" b="1" dirty="0"/>
-              <a:t>data preprocessing</a:t>
+              <a:t>Fake News Detection</a:t>
             </a:r>
             <a:r>
               <a:rPr lang="en-US" dirty="0"/>
-              <a:t>, where all text statements are cleaned by lowercasing, tokenizing, removing </a:t>
-            </a:r>
-            <a:r>
-              <a:rPr lang="en-US" dirty="0" err="1"/>
-              <a:t>stopwords</a:t>
+              <a:t> using the LIAR dataset, was executed through a structured, four-phase methodology. The process began with </a:t>
+            </a:r>
+            <a:r>
+              <a:rPr lang="en-US" b="1" dirty="0"/>
+              <a:t>Exploratory Data Analysis (EDA) and Feature Engineering</a:t>
             </a:r>
             <a:r>
               <a:rPr lang="en-US" dirty="0"/>
-              <a:t>, and lemmatizing to create consistent inputs. The processed text is then transformed into numerical features using the </a:t>
+              <a:t>, where raw text statements underwent cleaning and normalization (tokenization, lemmatization). Crucially, new predictive </a:t>
             </a:r>
             <a:r>
               <a:rPr lang="en-US" b="1" dirty="0"/>
-              <a:t>TF-IDF vectorizer</a:t>
+              <a:t>Ratio Features</a:t>
             </a:r>
             <a:r>
               <a:rPr lang="en-US" dirty="0"/>
-              <a:t>, capturing the importance of words and phrases across statements. Several machine learning models were trained and compared, including </a:t>
+              <a:t> were engineered based on the speaker's historical truthfulness counts. The second phase, </a:t>
+            </a:r>
+            <a:r>
+              <a:rPr lang="en-US" b="1" dirty="0"/>
+              <a:t>Baseline Model Making</a:t>
+            </a:r>
+            <a:r>
+              <a:rPr lang="en-US" dirty="0"/>
+              <a:t>, established an initial benchmark using a comprehensive </a:t>
+            </a:r>
+            <a:r>
+              <a:rPr lang="en-US" b="1" dirty="0" err="1"/>
+              <a:t>scikit</a:t>
+            </a:r>
+            <a:r>
+              <a:rPr lang="en-US" b="1" dirty="0"/>
+              <a:t>-learn Pipeline</a:t>
+            </a:r>
+            <a:r>
+              <a:rPr lang="en-US" dirty="0"/>
+              <a:t> incorporating TF-IDF for text and scaling/encoding for numerical and categorical features, training a </a:t>
             </a:r>
             <a:r>
               <a:rPr lang="en-US" b="1" dirty="0"/>
@@ -6172,83 +6204,64 @@
             </a:r>
             <a:r>
               <a:rPr lang="en-US" dirty="0"/>
-              <a:t>, </a:t>
+              <a:t> model. The project then moved into </a:t>
             </a:r>
             <a:r>
               <a:rPr lang="en-US" b="1" dirty="0"/>
-              <a:t>Naive Bayes</a:t>
+              <a:t>Comprehensive Experimentation</a:t>
             </a:r>
             <a:r>
               <a:rPr lang="en-US" dirty="0"/>
-              <a:t>, </a:t>
-            </a:r>
-            <a:r>
-              <a:rPr lang="en-US" b="1" dirty="0" err="1"/>
+              <a:t>, evaluating a wider array of models, including traditional Machine Learning (</a:t>
+            </a:r>
+            <a:r>
+              <a:rPr lang="en-US" dirty="0" err="1"/>
+              <a:t>LinearSVC</a:t>
+            </a:r>
+            <a:r>
+              <a:rPr lang="en-US" dirty="0"/>
+              <a:t>), Ensemble Methods, and </a:t>
+            </a:r>
+            <a:r>
+              <a:rPr lang="en-US" b="1" dirty="0"/>
+              <a:t>Deep Learning</a:t>
+            </a:r>
+            <a:r>
+              <a:rPr lang="en-US" dirty="0"/>
+              <a:t> models (LSTM and GRU), along with targeted hyperparameter tuning. The final, dedicated phase focused on </a:t>
+            </a:r>
+            <a:r>
+              <a:rPr lang="en-US" b="1" dirty="0"/>
+              <a:t>Specialized Gradient Boosting</a:t>
+            </a:r>
+            <a:r>
+              <a:rPr lang="en-US" dirty="0"/>
+              <a:t> (GBC/</a:t>
+            </a:r>
+            <a:r>
+              <a:rPr lang="en-US" dirty="0" err="1"/>
               <a:t>XGBoost</a:t>
             </a:r>
             <a:r>
               <a:rPr lang="en-US" dirty="0"/>
-              <a:t>, and </a:t>
+              <a:t>) for maximum performance. Throughout all phases, the models were primarily evaluated using the </a:t>
             </a:r>
             <a:r>
               <a:rPr lang="en-US" b="1" dirty="0"/>
-              <a:t>Gradient Boosting</a:t>
+              <a:t>Macro F1-Score</a:t>
             </a:r>
             <a:r>
               <a:rPr lang="en-US" dirty="0"/>
-              <a:t>, with </a:t>
+              <a:t> to ensure balanced performance across all six truthfulness categories. The best-performing model was then selected and applied to the untouched Test Set for a final, unbiased assessment before being deployed via a </a:t>
             </a:r>
             <a:r>
               <a:rPr lang="en-US" b="1" dirty="0"/>
-              <a:t>Gradient Boosting emerging as the best-performing model</a:t>
+              <a:t>Flask API</a:t>
             </a:r>
             <a:r>
               <a:rPr lang="en-US" dirty="0"/>
-              <a:t>. Model evaluation was conducted using standard metrics such as </a:t>
-            </a:r>
-            <a:r>
-              <a:rPr lang="en-US" b="1" dirty="0"/>
-              <a:t>accuracy</a:t>
-            </a:r>
-            <a:r>
-              <a:rPr lang="en-US" dirty="0"/>
-              <a:t>, </a:t>
-            </a:r>
-            <a:r>
-              <a:rPr lang="en-US" b="1" dirty="0"/>
-              <a:t>precision</a:t>
-            </a:r>
-            <a:r>
-              <a:rPr lang="en-US" dirty="0"/>
-              <a:t>, </a:t>
-            </a:r>
-            <a:r>
-              <a:rPr lang="en-US" b="1" dirty="0"/>
-              <a:t>recall</a:t>
-            </a:r>
-            <a:r>
-              <a:rPr lang="en-US" dirty="0"/>
-              <a:t>, and </a:t>
-            </a:r>
-            <a:r>
-              <a:rPr lang="en-US" b="1" dirty="0"/>
-              <a:t>F1-score</a:t>
-            </a:r>
-            <a:r>
-              <a:rPr lang="en-US" dirty="0"/>
-              <a:t> to ensure balanced assessment. The trained model was then integrated into a </a:t>
-            </a:r>
-            <a:r>
-              <a:rPr lang="en-US" b="1" dirty="0"/>
-              <a:t>Flask web application</a:t>
-            </a:r>
-            <a:r>
-              <a:rPr lang="en-US" dirty="0"/>
-              <a:t>, enabling users to input news statements and instantly receive a truthfulness prediction.</a:t>
-            </a:r>
-          </a:p>
-          <a:p>
-            <a:endParaRPr lang="en-US" dirty="0"/>
+              <a:t>.</a:t>
+            </a:r>
           </a:p>
         </p:txBody>
       </p:sp>

</xml_diff>

<commit_message>
loss curves and error analysis
</commit_message>
<xml_diff>
--- a/Imposter.pptx
+++ b/Imposter.pptx
@@ -19,8 +19,8 @@
     <p:sldId id="266" r:id="rId10"/>
     <p:sldId id="267" r:id="rId11"/>
     <p:sldId id="264" r:id="rId12"/>
-    <p:sldId id="271" r:id="rId13"/>
-    <p:sldId id="260" r:id="rId14"/>
+    <p:sldId id="260" r:id="rId13"/>
+    <p:sldId id="272" r:id="rId14"/>
     <p:sldId id="265" r:id="rId15"/>
     <p:sldId id="261" r:id="rId16"/>
   </p:sldIdLst>
@@ -211,7 +211,7 @@
           <a:p>
             <a:fld id="{8095211E-FF04-4F66-BD9B-ED115027C58E}" type="datetimeFigureOut">
               <a:rPr lang="en-US" smtClean="0"/>
-              <a:t>10/16/2025</a:t>
+              <a:t>10/19/2025</a:t>
             </a:fld>
             <a:endParaRPr lang="en-US"/>
           </a:p>
@@ -1224,7 +1224,7 @@
             <a:fld id="{B61BEF0D-F0BB-DE4B-95CE-6DB70DBA9567}" type="datetimeFigureOut">
               <a:rPr lang="en-US" dirty="0"/>
               <a:pPr/>
-              <a:t>10/16/2025</a:t>
+              <a:t>10/19/2025</a:t>
             </a:fld>
             <a:endParaRPr lang="en-US" dirty="0"/>
           </a:p>
@@ -1472,7 +1472,7 @@
             <a:fld id="{B61BEF0D-F0BB-DE4B-95CE-6DB70DBA9567}" type="datetimeFigureOut">
               <a:rPr lang="en-US" dirty="0"/>
               <a:pPr/>
-              <a:t>10/16/2025</a:t>
+              <a:t>10/19/2025</a:t>
             </a:fld>
             <a:endParaRPr lang="en-US" dirty="0"/>
           </a:p>
@@ -1783,7 +1783,7 @@
             <a:fld id="{B61BEF0D-F0BB-DE4B-95CE-6DB70DBA9567}" type="datetimeFigureOut">
               <a:rPr lang="en-US" dirty="0"/>
               <a:pPr/>
-              <a:t>10/16/2025</a:t>
+              <a:t>10/19/2025</a:t>
             </a:fld>
             <a:endParaRPr lang="en-US" dirty="0"/>
           </a:p>
@@ -2113,7 +2113,7 @@
             <a:fld id="{B61BEF0D-F0BB-DE4B-95CE-6DB70DBA9567}" type="datetimeFigureOut">
               <a:rPr lang="en-US" dirty="0"/>
               <a:pPr/>
-              <a:t>10/16/2025</a:t>
+              <a:t>10/19/2025</a:t>
             </a:fld>
             <a:endParaRPr lang="en-US" dirty="0"/>
           </a:p>
@@ -2424,7 +2424,7 @@
             <a:fld id="{B61BEF0D-F0BB-DE4B-95CE-6DB70DBA9567}" type="datetimeFigureOut">
               <a:rPr lang="en-US" dirty="0"/>
               <a:pPr/>
-              <a:t>10/16/2025</a:t>
+              <a:t>10/19/2025</a:t>
             </a:fld>
             <a:endParaRPr lang="en-US" dirty="0"/>
           </a:p>
@@ -2814,7 +2814,7 @@
             <a:fld id="{B61BEF0D-F0BB-DE4B-95CE-6DB70DBA9567}" type="datetimeFigureOut">
               <a:rPr lang="en-US" dirty="0"/>
               <a:pPr/>
-              <a:t>10/16/2025</a:t>
+              <a:t>10/19/2025</a:t>
             </a:fld>
             <a:endParaRPr lang="en-US" dirty="0"/>
           </a:p>
@@ -2980,7 +2980,7 @@
           <a:p>
             <a:fld id="{55C6B4A9-1611-4792-9094-5F34BCA07E0B}" type="datetimeFigureOut">
               <a:rPr lang="en-US" dirty="0"/>
-              <a:t>10/16/2025</a:t>
+              <a:t>10/19/2025</a:t>
             </a:fld>
             <a:endParaRPr lang="en-US" dirty="0"/>
           </a:p>
@@ -3156,7 +3156,7 @@
             <a:fld id="{B61BEF0D-F0BB-DE4B-95CE-6DB70DBA9567}" type="datetimeFigureOut">
               <a:rPr lang="en-US" dirty="0"/>
               <a:pPr/>
-              <a:t>10/16/2025</a:t>
+              <a:t>10/19/2025</a:t>
             </a:fld>
             <a:endParaRPr lang="en-US" dirty="0"/>
           </a:p>
@@ -3322,7 +3322,7 @@
           <a:p>
             <a:fld id="{42A54C80-263E-416B-A8E0-580EDEADCBDC}" type="datetimeFigureOut">
               <a:rPr lang="en-US" dirty="0"/>
-              <a:t>10/16/2025</a:t>
+              <a:t>10/19/2025</a:t>
             </a:fld>
             <a:endParaRPr lang="en-US" dirty="0"/>
           </a:p>
@@ -3565,7 +3565,7 @@
             <a:fld id="{B61BEF0D-F0BB-DE4B-95CE-6DB70DBA9567}" type="datetimeFigureOut">
               <a:rPr lang="en-US" dirty="0"/>
               <a:pPr/>
-              <a:t>10/16/2025</a:t>
+              <a:t>10/19/2025</a:t>
             </a:fld>
             <a:endParaRPr lang="en-US" dirty="0"/>
           </a:p>
@@ -3793,7 +3793,7 @@
           <a:p>
             <a:fld id="{42A54C80-263E-416B-A8E0-580EDEADCBDC}" type="datetimeFigureOut">
               <a:rPr lang="en-US" dirty="0"/>
-              <a:t>10/16/2025</a:t>
+              <a:t>10/19/2025</a:t>
             </a:fld>
             <a:endParaRPr lang="en-US" dirty="0"/>
           </a:p>
@@ -4163,7 +4163,7 @@
             <a:fld id="{B61BEF0D-F0BB-DE4B-95CE-6DB70DBA9567}" type="datetimeFigureOut">
               <a:rPr lang="en-US" dirty="0"/>
               <a:pPr/>
-              <a:t>10/16/2025</a:t>
+              <a:t>10/19/2025</a:t>
             </a:fld>
             <a:endParaRPr lang="en-US" dirty="0"/>
           </a:p>
@@ -4283,7 +4283,7 @@
             <a:fld id="{B61BEF0D-F0BB-DE4B-95CE-6DB70DBA9567}" type="datetimeFigureOut">
               <a:rPr lang="en-US" dirty="0"/>
               <a:pPr/>
-              <a:t>10/16/2025</a:t>
+              <a:t>10/19/2025</a:t>
             </a:fld>
             <a:endParaRPr lang="en-US" dirty="0"/>
           </a:p>
@@ -4375,7 +4375,7 @@
             <a:fld id="{B61BEF0D-F0BB-DE4B-95CE-6DB70DBA9567}" type="datetimeFigureOut">
               <a:rPr lang="en-US" dirty="0"/>
               <a:pPr/>
-              <a:t>10/16/2025</a:t>
+              <a:t>10/19/2025</a:t>
             </a:fld>
             <a:endParaRPr lang="en-US" dirty="0"/>
           </a:p>
@@ -4626,7 +4626,7 @@
           <a:p>
             <a:fld id="{42A54C80-263E-416B-A8E0-580EDEADCBDC}" type="datetimeFigureOut">
               <a:rPr lang="en-US" dirty="0"/>
-              <a:t>10/16/2025</a:t>
+              <a:t>10/19/2025</a:t>
             </a:fld>
             <a:endParaRPr lang="en-US" dirty="0"/>
           </a:p>
@@ -4928,7 +4928,7 @@
             <a:fld id="{B61BEF0D-F0BB-DE4B-95CE-6DB70DBA9567}" type="datetimeFigureOut">
               <a:rPr lang="en-US" dirty="0"/>
               <a:pPr/>
-              <a:t>10/16/2025</a:t>
+              <a:t>10/19/2025</a:t>
             </a:fld>
             <a:endParaRPr lang="en-US" dirty="0"/>
           </a:p>
@@ -5626,7 +5626,7 @@
             <a:fld id="{B61BEF0D-F0BB-DE4B-95CE-6DB70DBA9567}" type="datetimeFigureOut">
               <a:rPr lang="en-US" dirty="0"/>
               <a:pPr/>
-              <a:t>10/16/2025</a:t>
+              <a:t>10/19/2025</a:t>
             </a:fld>
             <a:endParaRPr lang="en-US" dirty="0"/>
           </a:p>
@@ -10244,64 +10244,6 @@
           <p:cNvPr id="2" name="Title 1">
             <a:extLst>
               <a:ext uri="{FF2B5EF4-FFF2-40B4-BE49-F238E27FC236}">
-                <a16:creationId xmlns:a16="http://schemas.microsoft.com/office/drawing/2014/main" id="{E15E2A07-24A1-4606-8916-2C008F5A519A}"/>
-              </a:ext>
-            </a:extLst>
-          </p:cNvPr>
-          <p:cNvSpPr>
-            <a:spLocks noGrp="1"/>
-          </p:cNvSpPr>
-          <p:nvPr>
-            <p:ph type="title"/>
-          </p:nvPr>
-        </p:nvSpPr>
-        <p:spPr/>
-        <p:txBody>
-          <a:bodyPr/>
-          <a:lstStyle/>
-          <a:p>
-            <a:r>
-              <a:rPr lang="en-US" dirty="0"/>
-              <a:t>Loss Curves (Top 2)</a:t>
-            </a:r>
-          </a:p>
-        </p:txBody>
-      </p:sp>
-    </p:spTree>
-    <p:extLst>
-      <p:ext uri="{BB962C8B-B14F-4D97-AF65-F5344CB8AC3E}">
-        <p14:creationId xmlns:p14="http://schemas.microsoft.com/office/powerpoint/2010/main" val="1301305411"/>
-      </p:ext>
-    </p:extLst>
-  </p:cSld>
-  <p:clrMapOvr>
-    <a:masterClrMapping/>
-  </p:clrMapOvr>
-</p:sld>
-</file>
-
-<file path=ppt/slides/slide13.xml><?xml version="1.0" encoding="utf-8"?>
-<p:sld xmlns:a="http://schemas.openxmlformats.org/drawingml/2006/main" xmlns:r="http://schemas.openxmlformats.org/officeDocument/2006/relationships" xmlns:p="http://schemas.openxmlformats.org/presentationml/2006/main">
-  <p:cSld>
-    <p:spTree>
-      <p:nvGrpSpPr>
-        <p:cNvPr id="1" name=""/>
-        <p:cNvGrpSpPr/>
-        <p:nvPr/>
-      </p:nvGrpSpPr>
-      <p:grpSpPr>
-        <a:xfrm>
-          <a:off x="0" y="0"/>
-          <a:ext cx="0" cy="0"/>
-          <a:chOff x="0" y="0"/>
-          <a:chExt cx="0" cy="0"/>
-        </a:xfrm>
-      </p:grpSpPr>
-      <p:sp>
-        <p:nvSpPr>
-          <p:cNvPr id="2" name="Title 1">
-            <a:extLst>
-              <a:ext uri="{FF2B5EF4-FFF2-40B4-BE49-F238E27FC236}">
                 <a16:creationId xmlns:a16="http://schemas.microsoft.com/office/drawing/2014/main" id="{0424FD6D-80EA-450A-A6AB-3F1D09A1D757}"/>
               </a:ext>
             </a:extLst>
@@ -10856,6 +10798,159 @@
     <p:extLst>
       <p:ext uri="{BB962C8B-B14F-4D97-AF65-F5344CB8AC3E}">
         <p14:creationId xmlns:p14="http://schemas.microsoft.com/office/powerpoint/2010/main" val="3674145016"/>
+      </p:ext>
+    </p:extLst>
+  </p:cSld>
+  <p:clrMapOvr>
+    <a:masterClrMapping/>
+  </p:clrMapOvr>
+</p:sld>
+</file>
+
+<file path=ppt/slides/slide13.xml><?xml version="1.0" encoding="utf-8"?>
+<p:sld xmlns:a="http://schemas.openxmlformats.org/drawingml/2006/main" xmlns:r="http://schemas.openxmlformats.org/officeDocument/2006/relationships" xmlns:p="http://schemas.openxmlformats.org/presentationml/2006/main">
+  <p:cSld>
+    <p:spTree>
+      <p:nvGrpSpPr>
+        <p:cNvPr id="1" name=""/>
+        <p:cNvGrpSpPr/>
+        <p:nvPr/>
+      </p:nvGrpSpPr>
+      <p:grpSpPr>
+        <a:xfrm>
+          <a:off x="0" y="0"/>
+          <a:ext cx="0" cy="0"/>
+          <a:chOff x="0" y="0"/>
+          <a:chExt cx="0" cy="0"/>
+        </a:xfrm>
+      </p:grpSpPr>
+      <p:sp>
+        <p:nvSpPr>
+          <p:cNvPr id="2" name="Title 1">
+            <a:extLst>
+              <a:ext uri="{FF2B5EF4-FFF2-40B4-BE49-F238E27FC236}">
+                <a16:creationId xmlns:a16="http://schemas.microsoft.com/office/drawing/2014/main" id="{D79FFA8D-9081-40B5-979D-887E668FE327}"/>
+              </a:ext>
+            </a:extLst>
+          </p:cNvPr>
+          <p:cNvSpPr>
+            <a:spLocks noGrp="1"/>
+          </p:cNvSpPr>
+          <p:nvPr>
+            <p:ph type="title"/>
+          </p:nvPr>
+        </p:nvSpPr>
+        <p:spPr/>
+        <p:txBody>
+          <a:bodyPr/>
+          <a:lstStyle/>
+          <a:p>
+            <a:r>
+              <a:rPr lang="en-US" dirty="0"/>
+              <a:t>Error Analysis</a:t>
+            </a:r>
+          </a:p>
+        </p:txBody>
+      </p:sp>
+      <p:pic>
+        <p:nvPicPr>
+          <p:cNvPr id="4" name="Picture 3">
+            <a:extLst>
+              <a:ext uri="{FF2B5EF4-FFF2-40B4-BE49-F238E27FC236}">
+                <a16:creationId xmlns:a16="http://schemas.microsoft.com/office/drawing/2014/main" id="{5179C47D-3873-4DC6-8527-9D5DCF7B5C62}"/>
+              </a:ext>
+            </a:extLst>
+          </p:cNvPr>
+          <p:cNvPicPr>
+            <a:picLocks noChangeAspect="1"/>
+          </p:cNvPicPr>
+          <p:nvPr/>
+        </p:nvPicPr>
+        <p:blipFill>
+          <a:blip r:embed="rId2"/>
+          <a:stretch>
+            <a:fillRect/>
+          </a:stretch>
+        </p:blipFill>
+        <p:spPr>
+          <a:xfrm>
+            <a:off x="3544478" y="161180"/>
+            <a:ext cx="3646200" cy="3073146"/>
+          </a:xfrm>
+          <a:prstGeom prst="rect">
+            <a:avLst/>
+          </a:prstGeom>
+        </p:spPr>
+      </p:pic>
+      <p:sp>
+        <p:nvSpPr>
+          <p:cNvPr id="5" name="TextBox 4">
+            <a:extLst>
+              <a:ext uri="{FF2B5EF4-FFF2-40B4-BE49-F238E27FC236}">
+                <a16:creationId xmlns:a16="http://schemas.microsoft.com/office/drawing/2014/main" id="{C011739C-3C41-45AC-A03A-63AADBF3DFC9}"/>
+              </a:ext>
+            </a:extLst>
+          </p:cNvPr>
+          <p:cNvSpPr txBox="1"/>
+          <p:nvPr/>
+        </p:nvSpPr>
+        <p:spPr>
+          <a:xfrm>
+            <a:off x="7447175" y="1483516"/>
+            <a:ext cx="4251490" cy="4801314"/>
+          </a:xfrm>
+          <a:prstGeom prst="rect">
+            <a:avLst/>
+          </a:prstGeom>
+          <a:noFill/>
+        </p:spPr>
+        <p:txBody>
+          <a:bodyPr wrap="square" rtlCol="0">
+            <a:spAutoFit/>
+          </a:bodyPr>
+          <a:lstStyle/>
+          <a:p>
+            <a:r>
+              <a:rPr lang="en-US" dirty="0"/>
+              <a:t>model's low performance (around 35% accuracy) is due to severe underfitting (high bias), which stems from a fundamental mismatch between the model and the feature engineering. Specifically, the use of One-Hot Encoding (OHE) on high-cardinality categorical features (like Speaker and Context) and the TF-IDF text features creates an extremely high-dimensional and sparse feature space. Gradient Boosting Classifiers struggle significantly to find meaningful patterns in this type of data, causing the model to fail to learn effectively and achieve low accuracy on both training and validation sets.</a:t>
+            </a:r>
+          </a:p>
+        </p:txBody>
+      </p:sp>
+      <p:pic>
+        <p:nvPicPr>
+          <p:cNvPr id="9" name="Picture 8">
+            <a:extLst>
+              <a:ext uri="{FF2B5EF4-FFF2-40B4-BE49-F238E27FC236}">
+                <a16:creationId xmlns:a16="http://schemas.microsoft.com/office/drawing/2014/main" id="{08AE9681-E17D-4C47-930B-C920F32DF6BA}"/>
+              </a:ext>
+            </a:extLst>
+          </p:cNvPr>
+          <p:cNvPicPr>
+            <a:picLocks noChangeAspect="1"/>
+          </p:cNvPicPr>
+          <p:nvPr/>
+        </p:nvPicPr>
+        <p:blipFill>
+          <a:blip r:embed="rId3"/>
+          <a:stretch>
+            <a:fillRect/>
+          </a:stretch>
+        </p:blipFill>
+        <p:spPr>
+          <a:xfrm>
+            <a:off x="370787" y="3229442"/>
+            <a:ext cx="5308687" cy="3396318"/>
+          </a:xfrm>
+          <a:prstGeom prst="rect">
+            <a:avLst/>
+          </a:prstGeom>
+        </p:spPr>
+      </p:pic>
+    </p:spTree>
+    <p:extLst>
+      <p:ext uri="{BB962C8B-B14F-4D97-AF65-F5344CB8AC3E}">
+        <p14:creationId xmlns:p14="http://schemas.microsoft.com/office/powerpoint/2010/main" val="1607983322"/>
       </p:ext>
     </p:extLst>
   </p:cSld>

</xml_diff>